<commit_message>
Increase font size for addbudgetsequencediagram
</commit_message>
<xml_diff>
--- a/docs/diagrams/AddBudgetSequenceDiagram.pptx
+++ b/docs/diagrams/AddBudgetSequenceDiagram.pptx
@@ -3541,14 +3541,14 @@
           <a:lstStyle/>
           <a:p>
             <a:r>
-              <a:rPr lang="en-US" sz="1200" b="1" dirty="0">
+              <a:rPr lang="en-US" sz="1400" b="1" dirty="0">
                 <a:solidFill>
                   <a:srgbClr val="7030A0"/>
                 </a:solidFill>
               </a:rPr>
               <a:t>Model</a:t>
             </a:r>
-            <a:endParaRPr lang="en-SG" sz="1200" b="1" dirty="0">
+            <a:endParaRPr lang="en-SG" sz="1400" b="1" dirty="0">
               <a:solidFill>
                 <a:srgbClr val="7030A0"/>
               </a:solidFill>
@@ -3602,14 +3602,14 @@
           <a:lstStyle/>
           <a:p>
             <a:r>
-              <a:rPr lang="en-US" sz="1200" b="1" dirty="0">
+              <a:rPr lang="en-US" sz="1400" b="1" dirty="0">
                 <a:solidFill>
                   <a:srgbClr val="0070C0"/>
                 </a:solidFill>
               </a:rPr>
               <a:t>Logic</a:t>
             </a:r>
-            <a:endParaRPr lang="en-SG" sz="1200" b="1" dirty="0">
+            <a:endParaRPr lang="en-SG" sz="1400" b="1" dirty="0">
               <a:solidFill>
                 <a:srgbClr val="0070C0"/>
               </a:solidFill>
@@ -3626,7 +3626,7 @@
         <p:spPr>
           <a:xfrm>
             <a:off x="883145" y="543946"/>
-            <a:ext cx="1455629" cy="346760"/>
+            <a:ext cx="1558002" cy="346760"/>
           </a:xfrm>
           <a:prstGeom prst="rect">
             <a:avLst/>
@@ -3661,7 +3661,7 @@
           <a:p>
             <a:pPr algn="ctr"/>
             <a:r>
-              <a:rPr lang="en-US" sz="1600" dirty="0">
+              <a:rPr lang="en-US" dirty="0">
                 <a:solidFill>
                   <a:schemeClr val="bg1"/>
                 </a:solidFill>
@@ -3669,14 +3669,14 @@
               <a:t>:</a:t>
             </a:r>
             <a:r>
-              <a:rPr lang="en-US" sz="1600" dirty="0" err="1">
+              <a:rPr lang="en-US" dirty="0" err="1">
                 <a:solidFill>
                   <a:schemeClr val="bg1"/>
                 </a:solidFill>
               </a:rPr>
               <a:t>LogicManager</a:t>
             </a:r>
-            <a:endParaRPr lang="en-SG" sz="1600" dirty="0">
+            <a:endParaRPr lang="en-SG" dirty="0">
               <a:solidFill>
                 <a:schemeClr val="bg1"/>
               </a:solidFill>
@@ -3778,8 +3778,8 @@
         </p:nvSpPr>
         <p:spPr>
           <a:xfrm>
-            <a:off x="3437188" y="423022"/>
-            <a:ext cx="1349150" cy="467684"/>
+            <a:off x="3357497" y="422924"/>
+            <a:ext cx="1483466" cy="467684"/>
           </a:xfrm>
           <a:prstGeom prst="rect">
             <a:avLst/>
@@ -3814,7 +3814,7 @@
           <a:p>
             <a:pPr algn="ctr"/>
             <a:r>
-              <a:rPr lang="en-US" sz="1600" dirty="0">
+              <a:rPr lang="en-US" dirty="0">
                 <a:solidFill>
                   <a:schemeClr val="bg1"/>
                 </a:solidFill>
@@ -3822,14 +3822,14 @@
               <a:t>:</a:t>
             </a:r>
             <a:r>
-              <a:rPr lang="en-US" sz="1600" dirty="0" err="1">
+              <a:rPr lang="en-US" dirty="0" err="1">
                 <a:solidFill>
                   <a:schemeClr val="bg1"/>
                 </a:solidFill>
               </a:rPr>
               <a:t>ePiggyParser</a:t>
             </a:r>
-            <a:endParaRPr lang="en-SG" sz="1600" dirty="0">
+            <a:endParaRPr lang="en-SG" dirty="0">
               <a:solidFill>
                 <a:schemeClr val="bg1"/>
               </a:solidFill>
@@ -4060,7 +4060,7 @@
         <p:spPr>
           <a:xfrm>
             <a:off x="-228599" y="990600"/>
-            <a:ext cx="1691546" cy="430887"/>
+            <a:ext cx="1691546" cy="492443"/>
           </a:xfrm>
           <a:prstGeom prst="rect">
             <a:avLst/>
@@ -4075,7 +4075,7 @@
           <a:p>
             <a:pPr algn="r"/>
             <a:r>
-              <a:rPr lang="en-US" sz="1400" dirty="0">
+              <a:rPr lang="en-US" sz="1600" dirty="0">
                 <a:solidFill>
                   <a:srgbClr val="0070C0"/>
                 </a:solidFill>
@@ -4083,7 +4083,7 @@
               <a:t>execute(“</a:t>
             </a:r>
             <a:r>
-              <a:rPr lang="en-US" sz="1400" dirty="0" err="1">
+              <a:rPr lang="en-US" sz="1600" dirty="0" err="1">
                 <a:solidFill>
                   <a:srgbClr val="0070C0"/>
                 </a:solidFill>
@@ -4091,7 +4091,7 @@
               <a:t>addBudget</a:t>
             </a:r>
             <a:r>
-              <a:rPr lang="en-US" sz="1400" dirty="0">
+              <a:rPr lang="en-US" sz="1600" dirty="0">
                 <a:solidFill>
                   <a:srgbClr val="0070C0"/>
                 </a:solidFill>
@@ -4148,7 +4148,7 @@
         <p:spPr>
           <a:xfrm>
             <a:off x="3243421" y="4572000"/>
-            <a:ext cx="855809" cy="215444"/>
+            <a:ext cx="855809" cy="246221"/>
           </a:xfrm>
           <a:prstGeom prst="rect">
             <a:avLst/>
@@ -4173,7 +4173,7 @@
           </a:lstStyle>
           <a:p>
             <a:r>
-              <a:rPr lang="en-US" dirty="0"/>
+              <a:rPr lang="en-US" sz="1600" dirty="0"/>
               <a:t>execute()</a:t>
             </a:r>
           </a:p>
@@ -4352,8 +4352,8 @@
         </p:nvSpPr>
         <p:spPr>
           <a:xfrm>
-            <a:off x="1691351" y="1169313"/>
-            <a:ext cx="2194849" cy="430887"/>
+            <a:off x="1691351" y="1107757"/>
+            <a:ext cx="2194849" cy="492443"/>
           </a:xfrm>
           <a:prstGeom prst="rect">
             <a:avLst/>
@@ -4378,19 +4378,19 @@
           </a:lstStyle>
           <a:p>
             <a:r>
-              <a:rPr lang="en-US" dirty="0" err="1"/>
+              <a:rPr lang="en-US" sz="1600" dirty="0" err="1"/>
               <a:t>parseCommand</a:t>
             </a:r>
             <a:r>
-              <a:rPr lang="en-US" dirty="0"/>
+              <a:rPr lang="en-US" sz="1600" dirty="0"/>
               <a:t>(“</a:t>
             </a:r>
             <a:r>
-              <a:rPr lang="en-US" dirty="0" err="1"/>
+              <a:rPr lang="en-US" sz="1600" dirty="0" err="1"/>
               <a:t>addBudget</a:t>
             </a:r>
             <a:r>
-              <a:rPr lang="en-US" dirty="0"/>
+              <a:rPr lang="en-US" sz="1600" dirty="0"/>
               <a:t> …”)</a:t>
             </a:r>
           </a:p>
@@ -4405,7 +4405,7 @@
         <p:spPr>
           <a:xfrm>
             <a:off x="5029200" y="6938428"/>
-            <a:ext cx="621216" cy="215444"/>
+            <a:ext cx="621216" cy="246221"/>
           </a:xfrm>
           <a:prstGeom prst="rect">
             <a:avLst/>
@@ -4430,9 +4430,10 @@
           </a:lstStyle>
           <a:p>
             <a:r>
-              <a:rPr lang="en-US" dirty="0"/>
+              <a:rPr lang="en-US" sz="1600" dirty="0"/>
               <a:t>result</a:t>
             </a:r>
+            <a:endParaRPr lang="en-US" dirty="0"/>
           </a:p>
         </p:txBody>
       </p:sp>
@@ -4445,7 +4446,7 @@
         <p:spPr>
           <a:xfrm>
             <a:off x="668420" y="6905101"/>
-            <a:ext cx="762000" cy="215444"/>
+            <a:ext cx="762000" cy="246221"/>
           </a:xfrm>
           <a:prstGeom prst="rect">
             <a:avLst/>
@@ -4470,9 +4471,10 @@
           </a:lstStyle>
           <a:p>
             <a:r>
-              <a:rPr lang="en-US" dirty="0"/>
+              <a:rPr lang="en-US" sz="1600" dirty="0"/>
               <a:t>result</a:t>
             </a:r>
+            <a:endParaRPr lang="en-US" dirty="0"/>
           </a:p>
         </p:txBody>
       </p:sp>
@@ -4520,7 +4522,7 @@
           <a:p>
             <a:pPr algn="ctr"/>
             <a:r>
-              <a:rPr lang="en-US" sz="1600" dirty="0">
+              <a:rPr lang="en-US" dirty="0">
                 <a:solidFill>
                   <a:schemeClr val="bg1"/>
                 </a:solidFill>
@@ -4528,14 +4530,14 @@
               <a:t>:</a:t>
             </a:r>
             <a:r>
-              <a:rPr lang="en-US" sz="1600" dirty="0" err="1">
+              <a:rPr lang="en-US" dirty="0" err="1">
                 <a:solidFill>
                   <a:schemeClr val="bg1"/>
                 </a:solidFill>
               </a:rPr>
               <a:t>ePiggy</a:t>
             </a:r>
-            <a:endParaRPr lang="en-SG" sz="1600" dirty="0">
+            <a:endParaRPr lang="en-SG" dirty="0">
               <a:solidFill>
                 <a:schemeClr val="bg1"/>
               </a:solidFill>
@@ -4552,7 +4554,7 @@
         <p:spPr>
           <a:xfrm>
             <a:off x="2724792" y="1905793"/>
-            <a:ext cx="220343" cy="215444"/>
+            <a:ext cx="220343" cy="246221"/>
           </a:xfrm>
           <a:prstGeom prst="rect">
             <a:avLst/>
@@ -4577,9 +4579,10 @@
           </a:lstStyle>
           <a:p>
             <a:r>
-              <a:rPr lang="en-US" dirty="0"/>
+              <a:rPr lang="en-US" sz="1600" dirty="0"/>
               <a:t>u</a:t>
             </a:r>
+            <a:endParaRPr lang="en-US" dirty="0"/>
           </a:p>
         </p:txBody>
       </p:sp>
@@ -4662,8 +4665,8 @@
         </p:nvSpPr>
         <p:spPr>
           <a:xfrm>
-            <a:off x="4864169" y="1260268"/>
-            <a:ext cx="1536631" cy="461538"/>
+            <a:off x="4864169" y="1214862"/>
+            <a:ext cx="1770068" cy="461538"/>
           </a:xfrm>
           <a:prstGeom prst="rect">
             <a:avLst/>
@@ -4698,7 +4701,7 @@
           <a:p>
             <a:pPr algn="ctr"/>
             <a:r>
-              <a:rPr lang="en-US" sz="1600" dirty="0">
+              <a:rPr lang="en-US" dirty="0">
                 <a:solidFill>
                   <a:schemeClr val="bg1"/>
                 </a:solidFill>
@@ -4706,14 +4709,14 @@
               <a:t>:</a:t>
             </a:r>
             <a:r>
-              <a:rPr lang="en-US" sz="1600" dirty="0" err="1">
+              <a:rPr lang="en-US" dirty="0" err="1">
                 <a:solidFill>
                   <a:schemeClr val="bg1"/>
                 </a:solidFill>
               </a:rPr>
               <a:t>AddBudgetCommandParser</a:t>
             </a:r>
-            <a:endParaRPr lang="en-SG" sz="1600" dirty="0">
+            <a:endParaRPr lang="en-SG" dirty="0">
               <a:solidFill>
                 <a:schemeClr val="bg1"/>
               </a:solidFill>
@@ -4869,8 +4872,8 @@
         </p:nvSpPr>
         <p:spPr>
           <a:xfrm>
-            <a:off x="12044356" y="4967549"/>
-            <a:ext cx="1066800" cy="184666"/>
+            <a:off x="12015832" y="4900010"/>
+            <a:ext cx="1441409" cy="246221"/>
           </a:xfrm>
           <a:prstGeom prst="rect">
             <a:avLst/>
@@ -4895,7 +4898,7 @@
           </a:lstStyle>
           <a:p>
             <a:r>
-              <a:rPr lang="en-US" sz="1200" dirty="0" err="1">
+              <a:rPr lang="en-US" sz="1600" dirty="0" err="1">
                 <a:solidFill>
                   <a:srgbClr val="7030A0"/>
                 </a:solidFill>
@@ -4903,14 +4906,14 @@
               <a:t>updateBudget</a:t>
             </a:r>
             <a:r>
-              <a:rPr lang="en-US" sz="1200" dirty="0">
+              <a:rPr lang="en-US" sz="1600" dirty="0">
                 <a:solidFill>
                   <a:srgbClr val="7030A0"/>
                 </a:solidFill>
               </a:rPr>
               <a:t>(b)</a:t>
             </a:r>
-            <a:endParaRPr lang="en-US" sz="1200" dirty="0"/>
+            <a:endParaRPr lang="en-US" sz="1600" dirty="0"/>
           </a:p>
         </p:txBody>
       </p:sp>
@@ -5012,8 +5015,8 @@
         </p:nvSpPr>
         <p:spPr>
           <a:xfrm>
-            <a:off x="5638321" y="1954629"/>
-            <a:ext cx="1793839" cy="646331"/>
+            <a:off x="5638321" y="1852136"/>
+            <a:ext cx="1793839" cy="738664"/>
           </a:xfrm>
           <a:prstGeom prst="rect">
             <a:avLst/>
@@ -5028,7 +5031,7 @@
           <a:p>
             <a:pPr algn="ctr"/>
             <a:r>
-              <a:rPr lang="en-US" sz="1400" dirty="0">
+              <a:rPr lang="en-US" sz="1600" dirty="0">
                 <a:solidFill>
                   <a:srgbClr val="0070C0"/>
                 </a:solidFill>
@@ -5036,7 +5039,7 @@
               <a:t>new Budget(</a:t>
             </a:r>
             <a:r>
-              <a:rPr lang="en-US" sz="1400" dirty="0" err="1">
+              <a:rPr lang="en-US" sz="1600" dirty="0" err="1">
                 <a:solidFill>
                   <a:srgbClr val="0070C0"/>
                 </a:solidFill>
@@ -5044,7 +5047,7 @@
               <a:t>budgetAmount</a:t>
             </a:r>
             <a:r>
-              <a:rPr lang="en-US" sz="1400" dirty="0">
+              <a:rPr lang="en-US" sz="1600" dirty="0">
                 <a:solidFill>
                   <a:srgbClr val="0070C0"/>
                 </a:solidFill>
@@ -5121,8 +5124,8 @@
         </p:nvSpPr>
         <p:spPr>
           <a:xfrm>
-            <a:off x="4460681" y="2343440"/>
-            <a:ext cx="885388" cy="215444"/>
+            <a:off x="4380097" y="2343440"/>
+            <a:ext cx="965972" cy="246221"/>
           </a:xfrm>
           <a:prstGeom prst="rect">
             <a:avLst/>
@@ -5136,7 +5139,7 @@
           <a:lstStyle/>
           <a:p>
             <a:r>
-              <a:rPr lang="en-US" sz="1400" dirty="0">
+              <a:rPr lang="en-US" sz="1600" dirty="0">
                 <a:solidFill>
                   <a:srgbClr val="0070C0"/>
                 </a:solidFill>
@@ -5144,7 +5147,7 @@
               <a:t>parse(</a:t>
             </a:r>
             <a:r>
-              <a:rPr lang="en-US" sz="1400" dirty="0" err="1">
+              <a:rPr lang="en-US" sz="1600" dirty="0" err="1">
                 <a:solidFill>
                   <a:srgbClr val="0070C0"/>
                 </a:solidFill>
@@ -5152,7 +5155,7 @@
               <a:t>args</a:t>
             </a:r>
             <a:r>
-              <a:rPr lang="en-US" sz="1400" dirty="0">
+              <a:rPr lang="en-US" sz="1600" dirty="0">
                 <a:solidFill>
                   <a:srgbClr val="0070C0"/>
                 </a:solidFill>
@@ -5212,14 +5215,14 @@
           <a:p>
             <a:pPr algn="ctr"/>
             <a:r>
-              <a:rPr lang="en-US" sz="1600" dirty="0">
+              <a:rPr lang="en-US" dirty="0">
                 <a:solidFill>
                   <a:schemeClr val="bg1"/>
                 </a:solidFill>
               </a:rPr>
               <a:t>b:Budget</a:t>
             </a:r>
-            <a:endParaRPr lang="en-SG" sz="1600" dirty="0">
+            <a:endParaRPr lang="en-SG" dirty="0">
               <a:solidFill>
                 <a:schemeClr val="bg1"/>
               </a:solidFill>
@@ -5384,8 +5387,8 @@
         </p:nvSpPr>
         <p:spPr>
           <a:xfrm>
-            <a:off x="5952452" y="3554276"/>
-            <a:ext cx="2385689" cy="215444"/>
+            <a:off x="5715000" y="3554276"/>
+            <a:ext cx="2521426" cy="246221"/>
           </a:xfrm>
           <a:prstGeom prst="rect">
             <a:avLst/>
@@ -5400,7 +5403,7 @@
           <a:p>
             <a:pPr algn="ctr"/>
             <a:r>
-              <a:rPr lang="en-US" sz="1400" dirty="0">
+              <a:rPr lang="en-US" sz="1600" dirty="0">
                 <a:solidFill>
                   <a:srgbClr val="0070C0"/>
                 </a:solidFill>
@@ -5408,7 +5411,7 @@
               <a:t>new </a:t>
             </a:r>
             <a:r>
-              <a:rPr lang="en-US" sz="1400" dirty="0" err="1">
+              <a:rPr lang="en-US" sz="1600" dirty="0" err="1">
                 <a:solidFill>
                   <a:srgbClr val="0070C0"/>
                 </a:solidFill>
@@ -5416,7 +5419,7 @@
               <a:t>AddBudgetCommand</a:t>
             </a:r>
             <a:r>
-              <a:rPr lang="en-US" sz="1400" dirty="0">
+              <a:rPr lang="en-US" sz="1600" dirty="0">
                 <a:solidFill>
                   <a:srgbClr val="0070C0"/>
                 </a:solidFill>
@@ -5443,7 +5446,7 @@
         </p:nvCxnSpPr>
         <p:spPr>
           <a:xfrm>
-            <a:off x="5662087" y="3778063"/>
+            <a:off x="5484238" y="3778063"/>
             <a:ext cx="2821562" cy="0"/>
           </a:xfrm>
           <a:prstGeom prst="straightConnector1">
@@ -5485,8 +5488,8 @@
         </p:nvSpPr>
         <p:spPr>
           <a:xfrm>
-            <a:off x="8483649" y="3547294"/>
-            <a:ext cx="1187468" cy="461538"/>
+            <a:off x="8305800" y="3547294"/>
+            <a:ext cx="1399066" cy="461538"/>
           </a:xfrm>
           <a:prstGeom prst="rect">
             <a:avLst/>
@@ -5519,15 +5522,16 @@
           <a:bodyPr rtlCol="0" anchor="ctr"/>
           <a:lstStyle/>
           <a:p>
-            <a:r>
-              <a:rPr lang="en-US" sz="1600" dirty="0">
+            <a:pPr algn="ctr"/>
+            <a:r>
+              <a:rPr lang="en-US" dirty="0">
                 <a:solidFill>
                   <a:schemeClr val="bg1"/>
                 </a:solidFill>
               </a:rPr>
               <a:t>a:AddBudgetCommand</a:t>
             </a:r>
-            <a:endParaRPr lang="en-SG" sz="1600" dirty="0">
+            <a:endParaRPr lang="en-SG" dirty="0">
               <a:solidFill>
                 <a:schemeClr val="bg1"/>
               </a:solidFill>
@@ -5694,8 +5698,8 @@
         </p:nvSpPr>
         <p:spPr>
           <a:xfrm>
-            <a:off x="7123300" y="4035992"/>
-            <a:ext cx="370729" cy="215444"/>
+            <a:off x="7123300" y="4020979"/>
+            <a:ext cx="370729" cy="246221"/>
           </a:xfrm>
           <a:prstGeom prst="rect">
             <a:avLst/>
@@ -5710,7 +5714,7 @@
           <a:p>
             <a:pPr algn="ctr"/>
             <a:r>
-              <a:rPr lang="en-US" sz="1400" dirty="0">
+              <a:rPr lang="en-US" sz="1600" dirty="0">
                 <a:solidFill>
                   <a:srgbClr val="0070C0"/>
                 </a:solidFill>
@@ -5781,7 +5785,7 @@
         <p:spPr>
           <a:xfrm>
             <a:off x="4670230" y="4014684"/>
-            <a:ext cx="370729" cy="215444"/>
+            <a:ext cx="370729" cy="246221"/>
           </a:xfrm>
           <a:prstGeom prst="rect">
             <a:avLst/>
@@ -5796,7 +5800,7 @@
           <a:p>
             <a:pPr algn="ctr"/>
             <a:r>
-              <a:rPr lang="en-US" sz="1400" dirty="0">
+              <a:rPr lang="en-US" sz="1600" dirty="0">
                 <a:solidFill>
                   <a:srgbClr val="0070C0"/>
                 </a:solidFill>
@@ -5867,7 +5871,7 @@
         <p:spPr>
           <a:xfrm>
             <a:off x="2244252" y="4141968"/>
-            <a:ext cx="1161156" cy="215444"/>
+            <a:ext cx="1161156" cy="246221"/>
           </a:xfrm>
           <a:prstGeom prst="rect">
             <a:avLst/>
@@ -5882,13 +5886,18 @@
           <a:p>
             <a:pPr algn="ctr"/>
             <a:r>
-              <a:rPr lang="en-US" sz="1400" dirty="0">
+              <a:rPr lang="en-US" sz="1600" dirty="0">
                 <a:solidFill>
                   <a:srgbClr val="0070C0"/>
                 </a:solidFill>
               </a:rPr>
               <a:t>command</a:t>
             </a:r>
+            <a:endParaRPr lang="en-US" sz="1400" dirty="0">
+              <a:solidFill>
+                <a:srgbClr val="0070C0"/>
+              </a:solidFill>
+            </a:endParaRPr>
           </a:p>
         </p:txBody>
       </p:sp>
@@ -5950,8 +5959,8 @@
         </p:nvSpPr>
         <p:spPr>
           <a:xfrm>
-            <a:off x="9116095" y="4589975"/>
-            <a:ext cx="1278198" cy="184666"/>
+            <a:off x="9013295" y="4541998"/>
+            <a:ext cx="1477399" cy="492443"/>
           </a:xfrm>
           <a:prstGeom prst="rect">
             <a:avLst/>
@@ -5976,7 +5985,7 @@
           </a:lstStyle>
           <a:p>
             <a:r>
-              <a:rPr lang="en-US" sz="1200" dirty="0" err="1">
+              <a:rPr lang="en-US" sz="1600" dirty="0" err="1">
                 <a:solidFill>
                   <a:srgbClr val="7030A0"/>
                 </a:solidFill>
@@ -5984,14 +5993,14 @@
               <a:t>addBudget</a:t>
             </a:r>
             <a:r>
-              <a:rPr lang="en-US" sz="1200" dirty="0">
+              <a:rPr lang="en-US" sz="1600" dirty="0">
                 <a:solidFill>
                   <a:srgbClr val="7030A0"/>
                 </a:solidFill>
               </a:rPr>
               <a:t>(index, b)</a:t>
             </a:r>
-            <a:endParaRPr lang="en-US" sz="1200" dirty="0"/>
+            <a:endParaRPr lang="en-US" sz="1600" dirty="0"/>
           </a:p>
         </p:txBody>
       </p:sp>
@@ -6062,8 +6071,8 @@
         </p:nvSpPr>
         <p:spPr>
           <a:xfrm>
-            <a:off x="10182330" y="423022"/>
-            <a:ext cx="841636" cy="300180"/>
+            <a:off x="10182329" y="541382"/>
+            <a:ext cx="922551" cy="296818"/>
           </a:xfrm>
           <a:prstGeom prst="rect">
             <a:avLst/>
@@ -6103,7 +6112,15 @@
                   <a:schemeClr val="bg1"/>
                 </a:solidFill>
               </a:rPr>
-              <a:t>: Model</a:t>
+              <a:t>: </a:t>
+            </a:r>
+            <a:r>
+              <a:rPr lang="en-US" dirty="0">
+                <a:solidFill>
+                  <a:schemeClr val="bg1"/>
+                </a:solidFill>
+              </a:rPr>
+              <a:t>Model</a:t>
             </a:r>
             <a:endParaRPr lang="en-SG" sz="1600" dirty="0">
               <a:solidFill>
@@ -6129,8 +6146,8 @@
         </p:nvCxnSpPr>
         <p:spPr>
           <a:xfrm>
-            <a:off x="10578469" y="738306"/>
-            <a:ext cx="2625" cy="5586294"/>
+            <a:off x="10559169" y="838200"/>
+            <a:ext cx="21925" cy="5416983"/>
           </a:xfrm>
           <a:prstGeom prst="line">
             <a:avLst/>
@@ -6218,8 +6235,8 @@
         </p:nvSpPr>
         <p:spPr>
           <a:xfrm>
-            <a:off x="9342026" y="6580397"/>
-            <a:ext cx="1153254" cy="461538"/>
+            <a:off x="9342025" y="6580397"/>
+            <a:ext cx="1340765" cy="461538"/>
           </a:xfrm>
           <a:prstGeom prst="rect">
             <a:avLst/>
@@ -6253,14 +6270,14 @@
           <a:lstStyle/>
           <a:p>
             <a:r>
-              <a:rPr lang="en-US" sz="1400" dirty="0" err="1">
+              <a:rPr lang="en-US" dirty="0" err="1">
                 <a:solidFill>
                   <a:schemeClr val="bg1"/>
                 </a:solidFill>
               </a:rPr>
               <a:t>result:CommandResult</a:t>
             </a:r>
-            <a:endParaRPr lang="en-SG" sz="1400" dirty="0">
+            <a:endParaRPr lang="en-SG" dirty="0">
               <a:solidFill>
                 <a:schemeClr val="bg1"/>
               </a:solidFill>
@@ -6372,8 +6389,8 @@
         </p:nvSpPr>
         <p:spPr>
           <a:xfrm>
-            <a:off x="10515600" y="4800600"/>
-            <a:ext cx="1061534" cy="184666"/>
+            <a:off x="10670598" y="4732749"/>
+            <a:ext cx="918417" cy="492443"/>
           </a:xfrm>
           <a:prstGeom prst="rect">
             <a:avLst/>
@@ -6401,7 +6418,7 @@
           </a:lstStyle>
           <a:p>
             <a:r>
-              <a:rPr lang="en-US" sz="1200" dirty="0" err="1">
+              <a:rPr lang="en-US" sz="1600" dirty="0" err="1">
                 <a:solidFill>
                   <a:srgbClr val="7030A0"/>
                 </a:solidFill>
@@ -6409,14 +6426,14 @@
               <a:t>addBudget</a:t>
             </a:r>
             <a:r>
-              <a:rPr lang="en-US" sz="1200" dirty="0">
+              <a:rPr lang="en-US" sz="1600" dirty="0">
                 <a:solidFill>
                   <a:srgbClr val="7030A0"/>
                 </a:solidFill>
               </a:rPr>
               <a:t>(b)</a:t>
             </a:r>
-            <a:endParaRPr lang="en-US" sz="1200" dirty="0">
+            <a:endParaRPr lang="en-US" sz="1600" dirty="0">
               <a:solidFill>
                 <a:schemeClr val="accent4">
                   <a:lumMod val="75000"/>
@@ -6537,8 +6554,8 @@
         </p:nvSpPr>
         <p:spPr>
           <a:xfrm>
-            <a:off x="12968447" y="4498330"/>
-            <a:ext cx="1814353" cy="335427"/>
+            <a:off x="12968448" y="4386670"/>
+            <a:ext cx="1643956" cy="447087"/>
           </a:xfrm>
           <a:prstGeom prst="rect">
             <a:avLst/>
@@ -6573,7 +6590,7 @@
           <a:p>
             <a:pPr algn="ctr"/>
             <a:r>
-              <a:rPr lang="en-US" sz="1600" dirty="0">
+              <a:rPr lang="en-US" dirty="0">
                 <a:solidFill>
                   <a:schemeClr val="bg1"/>
                 </a:solidFill>
@@ -6581,14 +6598,14 @@
               <a:t>:</a:t>
             </a:r>
             <a:r>
-              <a:rPr lang="en-US" sz="1600" dirty="0" err="1">
+              <a:rPr lang="en-US" dirty="0" err="1">
                 <a:solidFill>
                   <a:schemeClr val="bg1"/>
                 </a:solidFill>
               </a:rPr>
               <a:t>UniqueBudgetList</a:t>
             </a:r>
-            <a:endParaRPr lang="en-SG" sz="1600" dirty="0">
+            <a:endParaRPr lang="en-SG" dirty="0">
               <a:solidFill>
                 <a:schemeClr val="bg1"/>
               </a:solidFill>
@@ -6610,8 +6627,8 @@
         </p:nvSpPr>
         <p:spPr>
           <a:xfrm>
-            <a:off x="11697328" y="5196699"/>
-            <a:ext cx="1796357" cy="184666"/>
+            <a:off x="11845176" y="5203769"/>
+            <a:ext cx="1796357" cy="246221"/>
           </a:xfrm>
           <a:prstGeom prst="rect">
             <a:avLst/>
@@ -6639,7 +6656,7 @@
           </a:lstStyle>
           <a:p>
             <a:r>
-              <a:rPr lang="en-US" sz="1200" dirty="0" err="1">
+              <a:rPr lang="en-US" sz="1600" dirty="0" err="1">
                 <a:solidFill>
                   <a:srgbClr val="7030A0"/>
                 </a:solidFill>
@@ -6647,14 +6664,14 @@
               <a:t>addAtIndex</a:t>
             </a:r>
             <a:r>
-              <a:rPr lang="en-US" sz="1200" dirty="0">
+              <a:rPr lang="en-US" sz="1600" dirty="0">
                 <a:solidFill>
                   <a:srgbClr val="7030A0"/>
                 </a:solidFill>
               </a:rPr>
               <a:t>(index, b)</a:t>
             </a:r>
-            <a:endParaRPr lang="en-US" sz="1200" dirty="0">
+            <a:endParaRPr lang="en-US" sz="1600" dirty="0">
               <a:solidFill>
                 <a:schemeClr val="accent4">
                   <a:lumMod val="75000"/>

</xml_diff>

<commit_message>
update addbudgetsequencediagram based on dev guide comments
</commit_message>
<xml_diff>
--- a/docs/diagrams/AddBudgetSequenceDiagram.pptx
+++ b/docs/diagrams/AddBudgetSequenceDiagram.pptx
@@ -208,7 +208,7 @@
           <a:p>
             <a:fld id="{F5CC4B3F-88C1-4FFA-B1B6-F41C21DC6924}" type="datetimeFigureOut">
               <a:rPr lang="en-US" smtClean="0"/>
-              <a:t>4/11/2019</a:t>
+              <a:t>4/12/2019</a:t>
             </a:fld>
             <a:endParaRPr lang="en-US"/>
           </a:p>
@@ -654,7 +654,7 @@
           <a:p>
             <a:fld id="{78C97017-6FC3-485B-9764-EAC9E56C1D49}" type="datetimeFigureOut">
               <a:rPr lang="en-US" smtClean="0"/>
-              <a:t>4/11/2019</a:t>
+              <a:t>4/12/2019</a:t>
             </a:fld>
             <a:endParaRPr lang="en-US"/>
           </a:p>
@@ -822,7 +822,7 @@
           <a:p>
             <a:fld id="{78C97017-6FC3-485B-9764-EAC9E56C1D49}" type="datetimeFigureOut">
               <a:rPr lang="en-US" smtClean="0"/>
-              <a:t>4/11/2019</a:t>
+              <a:t>4/12/2019</a:t>
             </a:fld>
             <a:endParaRPr lang="en-US"/>
           </a:p>
@@ -1000,7 +1000,7 @@
           <a:p>
             <a:fld id="{78C97017-6FC3-485B-9764-EAC9E56C1D49}" type="datetimeFigureOut">
               <a:rPr lang="en-US" smtClean="0"/>
-              <a:t>4/11/2019</a:t>
+              <a:t>4/12/2019</a:t>
             </a:fld>
             <a:endParaRPr lang="en-US"/>
           </a:p>
@@ -1168,7 +1168,7 @@
           <a:p>
             <a:fld id="{78C97017-6FC3-485B-9764-EAC9E56C1D49}" type="datetimeFigureOut">
               <a:rPr lang="en-US" smtClean="0"/>
-              <a:t>4/11/2019</a:t>
+              <a:t>4/12/2019</a:t>
             </a:fld>
             <a:endParaRPr lang="en-US"/>
           </a:p>
@@ -1413,7 +1413,7 @@
           <a:p>
             <a:fld id="{78C97017-6FC3-485B-9764-EAC9E56C1D49}" type="datetimeFigureOut">
               <a:rPr lang="en-US" smtClean="0"/>
-              <a:t>4/11/2019</a:t>
+              <a:t>4/12/2019</a:t>
             </a:fld>
             <a:endParaRPr lang="en-US"/>
           </a:p>
@@ -1698,7 +1698,7 @@
           <a:p>
             <a:fld id="{78C97017-6FC3-485B-9764-EAC9E56C1D49}" type="datetimeFigureOut">
               <a:rPr lang="en-US" smtClean="0"/>
-              <a:t>4/11/2019</a:t>
+              <a:t>4/12/2019</a:t>
             </a:fld>
             <a:endParaRPr lang="en-US"/>
           </a:p>
@@ -2117,7 +2117,7 @@
           <a:p>
             <a:fld id="{78C97017-6FC3-485B-9764-EAC9E56C1D49}" type="datetimeFigureOut">
               <a:rPr lang="en-US" smtClean="0"/>
-              <a:t>4/11/2019</a:t>
+              <a:t>4/12/2019</a:t>
             </a:fld>
             <a:endParaRPr lang="en-US"/>
           </a:p>
@@ -2234,7 +2234,7 @@
           <a:p>
             <a:fld id="{78C97017-6FC3-485B-9764-EAC9E56C1D49}" type="datetimeFigureOut">
               <a:rPr lang="en-US" smtClean="0"/>
-              <a:t>4/11/2019</a:t>
+              <a:t>4/12/2019</a:t>
             </a:fld>
             <a:endParaRPr lang="en-US"/>
           </a:p>
@@ -2329,7 +2329,7 @@
           <a:p>
             <a:fld id="{78C97017-6FC3-485B-9764-EAC9E56C1D49}" type="datetimeFigureOut">
               <a:rPr lang="en-US" smtClean="0"/>
-              <a:t>4/11/2019</a:t>
+              <a:t>4/12/2019</a:t>
             </a:fld>
             <a:endParaRPr lang="en-US"/>
           </a:p>
@@ -2604,7 +2604,7 @@
           <a:p>
             <a:fld id="{78C97017-6FC3-485B-9764-EAC9E56C1D49}" type="datetimeFigureOut">
               <a:rPr lang="en-US" smtClean="0"/>
-              <a:t>4/11/2019</a:t>
+              <a:t>4/12/2019</a:t>
             </a:fld>
             <a:endParaRPr lang="en-US"/>
           </a:p>
@@ -2856,7 +2856,7 @@
           <a:p>
             <a:fld id="{78C97017-6FC3-485B-9764-EAC9E56C1D49}" type="datetimeFigureOut">
               <a:rPr lang="en-US" smtClean="0"/>
-              <a:t>4/11/2019</a:t>
+              <a:t>4/12/2019</a:t>
             </a:fld>
             <a:endParaRPr lang="en-US"/>
           </a:p>
@@ -3067,7 +3067,7 @@
           <a:p>
             <a:fld id="{78C97017-6FC3-485B-9764-EAC9E56C1D49}" type="datetimeFigureOut">
               <a:rPr lang="en-US" smtClean="0"/>
-              <a:t>4/11/2019</a:t>
+              <a:t>4/12/2019</a:t>
             </a:fld>
             <a:endParaRPr lang="en-US"/>
           </a:p>
@@ -6221,70 +6221,6 @@
           </a:fontRef>
         </p:style>
       </p:cxnSp>
-      <p:sp>
-        <p:nvSpPr>
-          <p:cNvPr id="110" name="Rectangle 62">
-            <a:extLst>
-              <a:ext uri="{FF2B5EF4-FFF2-40B4-BE49-F238E27FC236}">
-                <a16:creationId xmlns:a16="http://schemas.microsoft.com/office/drawing/2014/main" id="{C3C70252-3583-4883-B104-C46635F6837E}"/>
-              </a:ext>
-            </a:extLst>
-          </p:cNvPr>
-          <p:cNvSpPr/>
-          <p:nvPr/>
-        </p:nvSpPr>
-        <p:spPr>
-          <a:xfrm>
-            <a:off x="9342025" y="6580397"/>
-            <a:ext cx="1340765" cy="461538"/>
-          </a:xfrm>
-          <a:prstGeom prst="rect">
-            <a:avLst/>
-          </a:prstGeom>
-          <a:solidFill>
-            <a:srgbClr val="0070C0"/>
-          </a:solidFill>
-          <a:ln w="19050">
-            <a:solidFill>
-              <a:srgbClr val="0070C0"/>
-            </a:solidFill>
-          </a:ln>
-          <a:effectLst/>
-        </p:spPr>
-        <p:style>
-          <a:lnRef idx="1">
-            <a:schemeClr val="accent2"/>
-          </a:lnRef>
-          <a:fillRef idx="2">
-            <a:schemeClr val="accent2"/>
-          </a:fillRef>
-          <a:effectRef idx="1">
-            <a:schemeClr val="accent2"/>
-          </a:effectRef>
-          <a:fontRef idx="minor">
-            <a:schemeClr val="dk1"/>
-          </a:fontRef>
-        </p:style>
-        <p:txBody>
-          <a:bodyPr rtlCol="0" anchor="ctr"/>
-          <a:lstStyle/>
-          <a:p>
-            <a:r>
-              <a:rPr lang="en-US" dirty="0" err="1">
-                <a:solidFill>
-                  <a:schemeClr val="bg1"/>
-                </a:solidFill>
-              </a:rPr>
-              <a:t>result:CommandResult</a:t>
-            </a:r>
-            <a:endParaRPr lang="en-SG" dirty="0">
-              <a:solidFill>
-                <a:schemeClr val="bg1"/>
-              </a:solidFill>
-            </a:endParaRPr>
-          </a:p>
-        </p:txBody>
-      </p:sp>
       <p:cxnSp>
         <p:nvCxnSpPr>
           <p:cNvPr id="111" name="Straight Arrow Connector 110">
@@ -6340,13 +6276,14 @@
           </p:cNvPr>
           <p:cNvCxnSpPr>
             <a:cxnSpLocks/>
+            <a:endCxn id="75" idx="1"/>
           </p:cNvCxnSpPr>
           <p:nvPr/>
         </p:nvCxnSpPr>
         <p:spPr>
           <a:xfrm>
-            <a:off x="9105293" y="7162800"/>
-            <a:ext cx="649901" cy="0"/>
+            <a:off x="9105293" y="7129880"/>
+            <a:ext cx="800707" cy="9180"/>
           </a:xfrm>
           <a:prstGeom prst="straightConnector1">
             <a:avLst/>
@@ -6913,6 +6850,213 @@
           </a:effectRef>
           <a:fontRef idx="minor">
             <a:schemeClr val="tx1"/>
+          </a:fontRef>
+        </p:style>
+      </p:cxnSp>
+      <p:sp>
+        <p:nvSpPr>
+          <p:cNvPr id="75" name="Rectangle 74">
+            <a:extLst>
+              <a:ext uri="{FF2B5EF4-FFF2-40B4-BE49-F238E27FC236}">
+                <a16:creationId xmlns:a16="http://schemas.microsoft.com/office/drawing/2014/main" id="{9A3607FC-654F-490A-B809-38F4F8651440}"/>
+              </a:ext>
+            </a:extLst>
+          </p:cNvPr>
+          <p:cNvSpPr/>
+          <p:nvPr/>
+        </p:nvSpPr>
+        <p:spPr>
+          <a:xfrm>
+            <a:off x="9906000" y="7046648"/>
+            <a:ext cx="169175" cy="184824"/>
+          </a:xfrm>
+          <a:prstGeom prst="rect">
+            <a:avLst/>
+          </a:prstGeom>
+          <a:solidFill>
+            <a:srgbClr val="0070C0"/>
+          </a:solidFill>
+          <a:ln>
+            <a:solidFill>
+              <a:srgbClr val="0070C0"/>
+            </a:solidFill>
+          </a:ln>
+          <a:effectLst/>
+        </p:spPr>
+        <p:style>
+          <a:lnRef idx="1">
+            <a:schemeClr val="accent3"/>
+          </a:lnRef>
+          <a:fillRef idx="2">
+            <a:schemeClr val="accent3"/>
+          </a:fillRef>
+          <a:effectRef idx="1">
+            <a:schemeClr val="accent3"/>
+          </a:effectRef>
+          <a:fontRef idx="minor">
+            <a:schemeClr val="dk1"/>
+          </a:fontRef>
+        </p:style>
+        <p:txBody>
+          <a:bodyPr rtlCol="0" anchor="ctr"/>
+          <a:lstStyle/>
+          <a:p>
+            <a:pPr algn="ctr"/>
+            <a:endParaRPr lang="en-SG" sz="1400"/>
+          </a:p>
+        </p:txBody>
+      </p:sp>
+      <p:cxnSp>
+        <p:nvCxnSpPr>
+          <p:cNvPr id="76" name="Straight Connector 75">
+            <a:extLst>
+              <a:ext uri="{FF2B5EF4-FFF2-40B4-BE49-F238E27FC236}">
+                <a16:creationId xmlns:a16="http://schemas.microsoft.com/office/drawing/2014/main" id="{A39F325B-F626-4773-97C3-80278779550C}"/>
+              </a:ext>
+            </a:extLst>
+          </p:cNvPr>
+          <p:cNvCxnSpPr>
+            <a:cxnSpLocks/>
+          </p:cNvCxnSpPr>
+          <p:nvPr/>
+        </p:nvCxnSpPr>
+        <p:spPr>
+          <a:xfrm>
+            <a:off x="10002013" y="6883963"/>
+            <a:ext cx="9352" cy="491833"/>
+          </a:xfrm>
+          <a:prstGeom prst="line">
+            <a:avLst/>
+          </a:prstGeom>
+          <a:ln w="19050">
+            <a:solidFill>
+              <a:srgbClr val="0070C0"/>
+            </a:solidFill>
+            <a:prstDash val="sysDash"/>
+          </a:ln>
+          <a:effectLst/>
+        </p:spPr>
+        <p:style>
+          <a:lnRef idx="1">
+            <a:schemeClr val="accent1"/>
+          </a:lnRef>
+          <a:fillRef idx="2">
+            <a:schemeClr val="accent1"/>
+          </a:fillRef>
+          <a:effectRef idx="1">
+            <a:schemeClr val="accent1"/>
+          </a:effectRef>
+          <a:fontRef idx="minor">
+            <a:schemeClr val="dk1"/>
+          </a:fontRef>
+        </p:style>
+      </p:cxnSp>
+      <p:sp>
+        <p:nvSpPr>
+          <p:cNvPr id="110" name="Rectangle 62">
+            <a:extLst>
+              <a:ext uri="{FF2B5EF4-FFF2-40B4-BE49-F238E27FC236}">
+                <a16:creationId xmlns:a16="http://schemas.microsoft.com/office/drawing/2014/main" id="{C3C70252-3583-4883-B104-C46635F6837E}"/>
+              </a:ext>
+            </a:extLst>
+          </p:cNvPr>
+          <p:cNvSpPr/>
+          <p:nvPr/>
+        </p:nvSpPr>
+        <p:spPr>
+          <a:xfrm>
+            <a:off x="9342025" y="6580397"/>
+            <a:ext cx="1340765" cy="461538"/>
+          </a:xfrm>
+          <a:prstGeom prst="rect">
+            <a:avLst/>
+          </a:prstGeom>
+          <a:solidFill>
+            <a:srgbClr val="0070C0"/>
+          </a:solidFill>
+          <a:ln w="19050">
+            <a:solidFill>
+              <a:srgbClr val="0070C0"/>
+            </a:solidFill>
+          </a:ln>
+          <a:effectLst/>
+        </p:spPr>
+        <p:style>
+          <a:lnRef idx="1">
+            <a:schemeClr val="accent2"/>
+          </a:lnRef>
+          <a:fillRef idx="2">
+            <a:schemeClr val="accent2"/>
+          </a:fillRef>
+          <a:effectRef idx="1">
+            <a:schemeClr val="accent2"/>
+          </a:effectRef>
+          <a:fontRef idx="minor">
+            <a:schemeClr val="dk1"/>
+          </a:fontRef>
+        </p:style>
+        <p:txBody>
+          <a:bodyPr rtlCol="0" anchor="ctr"/>
+          <a:lstStyle/>
+          <a:p>
+            <a:r>
+              <a:rPr lang="en-US" dirty="0" err="1">
+                <a:solidFill>
+                  <a:schemeClr val="bg1"/>
+                </a:solidFill>
+              </a:rPr>
+              <a:t>result:CommandResult</a:t>
+            </a:r>
+            <a:endParaRPr lang="en-SG" dirty="0">
+              <a:solidFill>
+                <a:schemeClr val="bg1"/>
+              </a:solidFill>
+            </a:endParaRPr>
+          </a:p>
+        </p:txBody>
+      </p:sp>
+      <p:cxnSp>
+        <p:nvCxnSpPr>
+          <p:cNvPr id="77" name="Straight Connector 76">
+            <a:extLst>
+              <a:ext uri="{FF2B5EF4-FFF2-40B4-BE49-F238E27FC236}">
+                <a16:creationId xmlns:a16="http://schemas.microsoft.com/office/drawing/2014/main" id="{50663151-0DFA-476A-9D42-4BB275B1C9A3}"/>
+              </a:ext>
+            </a:extLst>
+          </p:cNvPr>
+          <p:cNvCxnSpPr>
+            <a:cxnSpLocks/>
+          </p:cNvCxnSpPr>
+          <p:nvPr/>
+        </p:nvCxnSpPr>
+        <p:spPr>
+          <a:xfrm>
+            <a:off x="7862172" y="2947058"/>
+            <a:ext cx="9352" cy="491833"/>
+          </a:xfrm>
+          <a:prstGeom prst="line">
+            <a:avLst/>
+          </a:prstGeom>
+          <a:ln w="19050">
+            <a:solidFill>
+              <a:srgbClr val="0070C0"/>
+            </a:solidFill>
+            <a:prstDash val="sysDash"/>
+          </a:ln>
+          <a:effectLst/>
+        </p:spPr>
+        <p:style>
+          <a:lnRef idx="1">
+            <a:schemeClr val="accent1"/>
+          </a:lnRef>
+          <a:fillRef idx="2">
+            <a:schemeClr val="accent1"/>
+          </a:fillRef>
+          <a:effectRef idx="1">
+            <a:schemeClr val="accent1"/>
+          </a:effectRef>
+          <a:fontRef idx="minor">
+            <a:schemeClr val="dk1"/>
           </a:fontRef>
         </p:style>
       </p:cxnSp>

</xml_diff>